<commit_message>
Working on adding new user.
</commit_message>
<xml_diff>
--- a/Tutorials/NetTodoApp-Part1-WebAPI/Resources/Architecture.pptx
+++ b/Tutorials/NetTodoApp-Part1-WebAPI/Resources/Architecture.pptx
@@ -8,6 +8,7 @@
     <p:sldId id="256" r:id="rId2"/>
     <p:sldId id="257" r:id="rId3"/>
     <p:sldId id="258" r:id="rId4"/>
+    <p:sldId id="259" r:id="rId5"/>
   </p:sldIdLst>
   <p:sldSz cx="12192000" cy="6858000"/>
   <p:notesSz cx="6858000" cy="9144000"/>
@@ -263,7 +264,7 @@
           <a:p>
             <a:fld id="{ACCBDB6E-0703-4FBB-B812-31F8EA23C7EF}" type="datetimeFigureOut">
               <a:rPr lang="en-GB" smtClean="0"/>
-              <a:t>29/08/2022</a:t>
+              <a:t>16/09/2022</a:t>
             </a:fld>
             <a:endParaRPr lang="en-GB"/>
           </a:p>
@@ -463,7 +464,7 @@
           <a:p>
             <a:fld id="{ACCBDB6E-0703-4FBB-B812-31F8EA23C7EF}" type="datetimeFigureOut">
               <a:rPr lang="en-GB" smtClean="0"/>
-              <a:t>29/08/2022</a:t>
+              <a:t>16/09/2022</a:t>
             </a:fld>
             <a:endParaRPr lang="en-GB"/>
           </a:p>
@@ -673,7 +674,7 @@
           <a:p>
             <a:fld id="{ACCBDB6E-0703-4FBB-B812-31F8EA23C7EF}" type="datetimeFigureOut">
               <a:rPr lang="en-GB" smtClean="0"/>
-              <a:t>29/08/2022</a:t>
+              <a:t>16/09/2022</a:t>
             </a:fld>
             <a:endParaRPr lang="en-GB"/>
           </a:p>
@@ -873,7 +874,7 @@
           <a:p>
             <a:fld id="{ACCBDB6E-0703-4FBB-B812-31F8EA23C7EF}" type="datetimeFigureOut">
               <a:rPr lang="en-GB" smtClean="0"/>
-              <a:t>29/08/2022</a:t>
+              <a:t>16/09/2022</a:t>
             </a:fld>
             <a:endParaRPr lang="en-GB"/>
           </a:p>
@@ -1149,7 +1150,7 @@
           <a:p>
             <a:fld id="{ACCBDB6E-0703-4FBB-B812-31F8EA23C7EF}" type="datetimeFigureOut">
               <a:rPr lang="en-GB" smtClean="0"/>
-              <a:t>29/08/2022</a:t>
+              <a:t>16/09/2022</a:t>
             </a:fld>
             <a:endParaRPr lang="en-GB"/>
           </a:p>
@@ -1417,7 +1418,7 @@
           <a:p>
             <a:fld id="{ACCBDB6E-0703-4FBB-B812-31F8EA23C7EF}" type="datetimeFigureOut">
               <a:rPr lang="en-GB" smtClean="0"/>
-              <a:t>29/08/2022</a:t>
+              <a:t>16/09/2022</a:t>
             </a:fld>
             <a:endParaRPr lang="en-GB"/>
           </a:p>
@@ -1832,7 +1833,7 @@
           <a:p>
             <a:fld id="{ACCBDB6E-0703-4FBB-B812-31F8EA23C7EF}" type="datetimeFigureOut">
               <a:rPr lang="en-GB" smtClean="0"/>
-              <a:t>29/08/2022</a:t>
+              <a:t>16/09/2022</a:t>
             </a:fld>
             <a:endParaRPr lang="en-GB"/>
           </a:p>
@@ -1974,7 +1975,7 @@
           <a:p>
             <a:fld id="{ACCBDB6E-0703-4FBB-B812-31F8EA23C7EF}" type="datetimeFigureOut">
               <a:rPr lang="en-GB" smtClean="0"/>
-              <a:t>29/08/2022</a:t>
+              <a:t>16/09/2022</a:t>
             </a:fld>
             <a:endParaRPr lang="en-GB"/>
           </a:p>
@@ -2087,7 +2088,7 @@
           <a:p>
             <a:fld id="{ACCBDB6E-0703-4FBB-B812-31F8EA23C7EF}" type="datetimeFigureOut">
               <a:rPr lang="en-GB" smtClean="0"/>
-              <a:t>29/08/2022</a:t>
+              <a:t>16/09/2022</a:t>
             </a:fld>
             <a:endParaRPr lang="en-GB"/>
           </a:p>
@@ -2400,7 +2401,7 @@
           <a:p>
             <a:fld id="{ACCBDB6E-0703-4FBB-B812-31F8EA23C7EF}" type="datetimeFigureOut">
               <a:rPr lang="en-GB" smtClean="0"/>
-              <a:t>29/08/2022</a:t>
+              <a:t>16/09/2022</a:t>
             </a:fld>
             <a:endParaRPr lang="en-GB"/>
           </a:p>
@@ -2689,7 +2690,7 @@
           <a:p>
             <a:fld id="{ACCBDB6E-0703-4FBB-B812-31F8EA23C7EF}" type="datetimeFigureOut">
               <a:rPr lang="en-GB" smtClean="0"/>
-              <a:t>29/08/2022</a:t>
+              <a:t>16/09/2022</a:t>
             </a:fld>
             <a:endParaRPr lang="en-GB"/>
           </a:p>
@@ -2932,7 +2933,7 @@
           <a:p>
             <a:fld id="{ACCBDB6E-0703-4FBB-B812-31F8EA23C7EF}" type="datetimeFigureOut">
               <a:rPr lang="en-GB" smtClean="0"/>
-              <a:t>29/08/2022</a:t>
+              <a:t>16/09/2022</a:t>
             </a:fld>
             <a:endParaRPr lang="en-GB"/>
           </a:p>
@@ -5111,6 +5112,375 @@
 </p:sld>
 </file>
 
+<file path=ppt/slides/slide4.xml><?xml version="1.0" encoding="utf-8"?>
+<p:sld xmlns:a="http://schemas.openxmlformats.org/drawingml/2006/main" xmlns:r="http://schemas.openxmlformats.org/officeDocument/2006/relationships" xmlns:p="http://schemas.openxmlformats.org/presentationml/2006/main">
+  <p:cSld>
+    <p:spTree>
+      <p:nvGrpSpPr>
+        <p:cNvPr id="1" name=""/>
+        <p:cNvGrpSpPr/>
+        <p:nvPr/>
+      </p:nvGrpSpPr>
+      <p:grpSpPr>
+        <a:xfrm>
+          <a:off x="0" y="0"/>
+          <a:ext cx="0" cy="0"/>
+          <a:chOff x="0" y="0"/>
+          <a:chExt cx="0" cy="0"/>
+        </a:xfrm>
+      </p:grpSpPr>
+      <p:sp>
+        <p:nvSpPr>
+          <p:cNvPr id="4" name="Rectangle 3">
+            <a:extLst>
+              <a:ext uri="{FF2B5EF4-FFF2-40B4-BE49-F238E27FC236}">
+                <a16:creationId xmlns:a16="http://schemas.microsoft.com/office/drawing/2014/main" id="{E59EAAB5-7895-4E88-9D20-1FDDF85C0684}"/>
+              </a:ext>
+            </a:extLst>
+          </p:cNvPr>
+          <p:cNvSpPr/>
+          <p:nvPr/>
+        </p:nvSpPr>
+        <p:spPr>
+          <a:xfrm>
+            <a:off x="3895725" y="284085"/>
+            <a:ext cx="3669622" cy="2084466"/>
+          </a:xfrm>
+          <a:prstGeom prst="rect">
+            <a:avLst/>
+          </a:prstGeom>
+          <a:solidFill>
+            <a:schemeClr val="accent1">
+              <a:lumMod val="20000"/>
+              <a:lumOff val="80000"/>
+            </a:schemeClr>
+          </a:solidFill>
+          <a:ln>
+            <a:solidFill>
+              <a:schemeClr val="accent1"/>
+            </a:solidFill>
+          </a:ln>
+        </p:spPr>
+        <p:style>
+          <a:lnRef idx="2">
+            <a:schemeClr val="accent1">
+              <a:shade val="50000"/>
+            </a:schemeClr>
+          </a:lnRef>
+          <a:fillRef idx="1">
+            <a:schemeClr val="accent1"/>
+          </a:fillRef>
+          <a:effectRef idx="0">
+            <a:schemeClr val="accent1"/>
+          </a:effectRef>
+          <a:fontRef idx="minor">
+            <a:schemeClr val="lt1"/>
+          </a:fontRef>
+        </p:style>
+        <p:txBody>
+          <a:bodyPr rtlCol="0" anchor="ctr"/>
+          <a:lstStyle/>
+          <a:p>
+            <a:pPr algn="ctr"/>
+            <a:endParaRPr lang="en-GB">
+              <a:solidFill>
+                <a:schemeClr val="tx1"/>
+              </a:solidFill>
+            </a:endParaRPr>
+          </a:p>
+        </p:txBody>
+      </p:sp>
+      <p:sp>
+        <p:nvSpPr>
+          <p:cNvPr id="5" name="Rectangle: Rounded Corners 4">
+            <a:extLst>
+              <a:ext uri="{FF2B5EF4-FFF2-40B4-BE49-F238E27FC236}">
+                <a16:creationId xmlns:a16="http://schemas.microsoft.com/office/drawing/2014/main" id="{3C4AA43B-B891-437F-85F2-1A571D9E3598}"/>
+              </a:ext>
+            </a:extLst>
+          </p:cNvPr>
+          <p:cNvSpPr/>
+          <p:nvPr/>
+        </p:nvSpPr>
+        <p:spPr>
+          <a:xfrm>
+            <a:off x="4021585" y="381740"/>
+            <a:ext cx="3400147" cy="951760"/>
+          </a:xfrm>
+          <a:prstGeom prst="roundRect">
+            <a:avLst/>
+          </a:prstGeom>
+          <a:solidFill>
+            <a:schemeClr val="accent4">
+              <a:lumMod val="40000"/>
+              <a:lumOff val="60000"/>
+            </a:schemeClr>
+          </a:solidFill>
+          <a:ln>
+            <a:solidFill>
+              <a:schemeClr val="accent4"/>
+            </a:solidFill>
+          </a:ln>
+        </p:spPr>
+        <p:style>
+          <a:lnRef idx="2">
+            <a:schemeClr val="accent1">
+              <a:shade val="50000"/>
+            </a:schemeClr>
+          </a:lnRef>
+          <a:fillRef idx="1">
+            <a:schemeClr val="accent1"/>
+          </a:fillRef>
+          <a:effectRef idx="0">
+            <a:schemeClr val="accent1"/>
+          </a:effectRef>
+          <a:fontRef idx="minor">
+            <a:schemeClr val="lt1"/>
+          </a:fontRef>
+        </p:style>
+        <p:txBody>
+          <a:bodyPr rtlCol="0" anchor="ctr"/>
+          <a:lstStyle/>
+          <a:p>
+            <a:pPr algn="ctr"/>
+            <a:r>
+              <a:rPr lang="da-DK" dirty="0">
+                <a:solidFill>
+                  <a:schemeClr val="tx1"/>
+                </a:solidFill>
+              </a:rPr>
+              <a:t>UI</a:t>
+            </a:r>
+          </a:p>
+          <a:p>
+            <a:pPr algn="ctr"/>
+            <a:endParaRPr lang="da-DK" dirty="0">
+              <a:solidFill>
+                <a:schemeClr val="tx1"/>
+              </a:solidFill>
+            </a:endParaRPr>
+          </a:p>
+          <a:p>
+            <a:pPr algn="ctr"/>
+            <a:endParaRPr lang="en-GB" dirty="0">
+              <a:solidFill>
+                <a:schemeClr val="tx1"/>
+              </a:solidFill>
+            </a:endParaRPr>
+          </a:p>
+        </p:txBody>
+      </p:sp>
+      <p:sp>
+        <p:nvSpPr>
+          <p:cNvPr id="6" name="Rectangle: Rounded Corners 5">
+            <a:extLst>
+              <a:ext uri="{FF2B5EF4-FFF2-40B4-BE49-F238E27FC236}">
+                <a16:creationId xmlns:a16="http://schemas.microsoft.com/office/drawing/2014/main" id="{E72CCD1C-1478-4AAC-9A3A-B057E64D7B08}"/>
+              </a:ext>
+            </a:extLst>
+          </p:cNvPr>
+          <p:cNvSpPr/>
+          <p:nvPr/>
+        </p:nvSpPr>
+        <p:spPr>
+          <a:xfrm>
+            <a:off x="4021585" y="1431156"/>
+            <a:ext cx="3400147" cy="255233"/>
+          </a:xfrm>
+          <a:prstGeom prst="roundRect">
+            <a:avLst/>
+          </a:prstGeom>
+          <a:solidFill>
+            <a:schemeClr val="bg1">
+              <a:lumMod val="85000"/>
+            </a:schemeClr>
+          </a:solidFill>
+        </p:spPr>
+        <p:style>
+          <a:lnRef idx="2">
+            <a:schemeClr val="accent1">
+              <a:shade val="50000"/>
+            </a:schemeClr>
+          </a:lnRef>
+          <a:fillRef idx="1">
+            <a:schemeClr val="accent1"/>
+          </a:fillRef>
+          <a:effectRef idx="0">
+            <a:schemeClr val="accent1"/>
+          </a:effectRef>
+          <a:fontRef idx="minor">
+            <a:schemeClr val="lt1"/>
+          </a:fontRef>
+        </p:style>
+        <p:txBody>
+          <a:bodyPr rtlCol="0" anchor="ctr"/>
+          <a:lstStyle/>
+          <a:p>
+            <a:pPr algn="ctr"/>
+            <a:r>
+              <a:rPr lang="da-DK" dirty="0">
+                <a:solidFill>
+                  <a:schemeClr val="tx1"/>
+                </a:solidFill>
+              </a:rPr>
+              <a:t>Interfaces</a:t>
+            </a:r>
+            <a:endParaRPr lang="en-GB" dirty="0">
+              <a:solidFill>
+                <a:schemeClr val="tx1"/>
+              </a:solidFill>
+            </a:endParaRPr>
+          </a:p>
+        </p:txBody>
+      </p:sp>
+      <p:sp>
+        <p:nvSpPr>
+          <p:cNvPr id="7" name="Rectangle: Rounded Corners 6">
+            <a:extLst>
+              <a:ext uri="{FF2B5EF4-FFF2-40B4-BE49-F238E27FC236}">
+                <a16:creationId xmlns:a16="http://schemas.microsoft.com/office/drawing/2014/main" id="{9CD1FB2B-C625-4FBB-8724-4E39577A490F}"/>
+              </a:ext>
+            </a:extLst>
+          </p:cNvPr>
+          <p:cNvSpPr/>
+          <p:nvPr/>
+        </p:nvSpPr>
+        <p:spPr>
+          <a:xfrm>
+            <a:off x="4021584" y="1750752"/>
+            <a:ext cx="3400147" cy="506027"/>
+          </a:xfrm>
+          <a:prstGeom prst="roundRect">
+            <a:avLst/>
+          </a:prstGeom>
+          <a:solidFill>
+            <a:srgbClr val="FFC715"/>
+          </a:solidFill>
+          <a:ln>
+            <a:solidFill>
+              <a:schemeClr val="accent4"/>
+            </a:solidFill>
+          </a:ln>
+        </p:spPr>
+        <p:style>
+          <a:lnRef idx="2">
+            <a:schemeClr val="accent1">
+              <a:shade val="50000"/>
+            </a:schemeClr>
+          </a:lnRef>
+          <a:fillRef idx="1">
+            <a:schemeClr val="accent1"/>
+          </a:fillRef>
+          <a:effectRef idx="0">
+            <a:schemeClr val="accent1"/>
+          </a:effectRef>
+          <a:fontRef idx="minor">
+            <a:schemeClr val="lt1"/>
+          </a:fontRef>
+        </p:style>
+        <p:txBody>
+          <a:bodyPr rtlCol="0" anchor="ctr"/>
+          <a:lstStyle/>
+          <a:p>
+            <a:pPr algn="ctr"/>
+            <a:r>
+              <a:rPr lang="da-DK" dirty="0">
+                <a:solidFill>
+                  <a:schemeClr val="tx1"/>
+                </a:solidFill>
+              </a:rPr>
+              <a:t>Clients</a:t>
+            </a:r>
+            <a:endParaRPr lang="en-GB" dirty="0">
+              <a:solidFill>
+                <a:schemeClr val="tx1"/>
+              </a:solidFill>
+            </a:endParaRPr>
+          </a:p>
+        </p:txBody>
+      </p:sp>
+      <p:sp>
+        <p:nvSpPr>
+          <p:cNvPr id="8" name="Rectangle: Rounded Corners 7">
+            <a:extLst>
+              <a:ext uri="{FF2B5EF4-FFF2-40B4-BE49-F238E27FC236}">
+                <a16:creationId xmlns:a16="http://schemas.microsoft.com/office/drawing/2014/main" id="{CE15DF0E-509D-4650-909F-759DEDA4F999}"/>
+              </a:ext>
+            </a:extLst>
+          </p:cNvPr>
+          <p:cNvSpPr/>
+          <p:nvPr/>
+        </p:nvSpPr>
+        <p:spPr>
+          <a:xfrm>
+            <a:off x="4070965" y="891681"/>
+            <a:ext cx="3301386" cy="371970"/>
+          </a:xfrm>
+          <a:prstGeom prst="roundRect">
+            <a:avLst/>
+          </a:prstGeom>
+          <a:solidFill>
+            <a:schemeClr val="accent4">
+              <a:lumMod val="60000"/>
+              <a:lumOff val="40000"/>
+            </a:schemeClr>
+          </a:solidFill>
+          <a:ln>
+            <a:solidFill>
+              <a:schemeClr val="accent4"/>
+            </a:solidFill>
+          </a:ln>
+        </p:spPr>
+        <p:style>
+          <a:lnRef idx="2">
+            <a:schemeClr val="accent1">
+              <a:shade val="50000"/>
+            </a:schemeClr>
+          </a:lnRef>
+          <a:fillRef idx="1">
+            <a:schemeClr val="accent1"/>
+          </a:fillRef>
+          <a:effectRef idx="0">
+            <a:schemeClr val="accent1"/>
+          </a:effectRef>
+          <a:fontRef idx="minor">
+            <a:schemeClr val="lt1"/>
+          </a:fontRef>
+        </p:style>
+        <p:txBody>
+          <a:bodyPr rtlCol="0" anchor="ctr"/>
+          <a:lstStyle/>
+          <a:p>
+            <a:pPr algn="ctr"/>
+            <a:r>
+              <a:rPr lang="da-DK" dirty="0">
+                <a:solidFill>
+                  <a:schemeClr val="tx1"/>
+                </a:solidFill>
+              </a:rPr>
+              <a:t>View models</a:t>
+            </a:r>
+            <a:endParaRPr lang="en-GB" dirty="0">
+              <a:solidFill>
+                <a:schemeClr val="tx1"/>
+              </a:solidFill>
+            </a:endParaRPr>
+          </a:p>
+        </p:txBody>
+      </p:sp>
+    </p:spTree>
+    <p:extLst>
+      <p:ext uri="{BB962C8B-B14F-4D97-AF65-F5344CB8AC3E}">
+        <p14:creationId xmlns:p14="http://schemas.microsoft.com/office/powerpoint/2010/main" val="620450181"/>
+      </p:ext>
+    </p:extLst>
+  </p:cSld>
+  <p:clrMapOvr>
+    <a:masterClrMapping/>
+  </p:clrMapOvr>
+</p:sld>
+</file>
+
 <file path=ppt/theme/theme1.xml><?xml version="1.0" encoding="utf-8"?>
 <a:theme xmlns:a="http://schemas.openxmlformats.org/drawingml/2006/main" name="Office Theme">
   <a:themeElements>

</xml_diff>